<commit_message>
Added a slogan to the logo text
</commit_message>
<xml_diff>
--- a/logo-words.pptx
+++ b/logo-words.pptx
@@ -2981,7 +2981,7 @@
         </p:nvSpPr>
         <p:spPr>
           <a:xfrm>
-            <a:off x="218402" y="446136"/>
+            <a:off x="218402" y="230155"/>
             <a:ext cx="6182398" cy="1938992"/>
           </a:xfrm>
           <a:prstGeom prst="rect">
@@ -3018,6 +3018,44 @@
                 <a:srgbClr val="548235"/>
               </a:solidFill>
             </a:endParaRPr>
+          </a:p>
+        </p:txBody>
+      </p:sp>
+      <p:sp>
+        <p:nvSpPr>
+          <p:cNvPr id="2" name="TextBox 1"/>
+          <p:cNvSpPr txBox="1"/>
+          <p:nvPr/>
+        </p:nvSpPr>
+        <p:spPr>
+          <a:xfrm>
+            <a:off x="1387151" y="2169147"/>
+            <a:ext cx="3162725" cy="461665"/>
+          </a:xfrm>
+          <a:prstGeom prst="rect">
+            <a:avLst/>
+          </a:prstGeom>
+          <a:noFill/>
+        </p:spPr>
+        <p:txBody>
+          <a:bodyPr wrap="none" rtlCol="0">
+            <a:spAutoFit/>
+          </a:bodyPr>
+          <a:lstStyle/>
+          <a:p>
+            <a:r>
+              <a:rPr lang="en-US" sz="2400" dirty="0" smtClean="0"/>
+              <a:t>“To 2</a:t>
+            </a:r>
+            <a:r>
+              <a:rPr lang="en-US" sz="2400" baseline="38000" dirty="0" smtClean="0"/>
+              <a:t>e_max</a:t>
+            </a:r>
+            <a:r>
+              <a:rPr lang="en-US" sz="2400" dirty="0" smtClean="0"/>
+              <a:t> and beyond!”</a:t>
+            </a:r>
+            <a:endParaRPr lang="en-US" sz="2400" dirty="0"/>
           </a:p>
         </p:txBody>
       </p:sp>

</xml_diff>